<commit_message>
add descriptive statistics for similar data sets
</commit_message>
<xml_diff>
--- a/Join files/Merging data.pptx
+++ b/Join files/Merging data.pptx
@@ -2632,22 +2632,9 @@
           </a:r>
           <a:r>
             <a:rPr lang="nl-NL" dirty="0"/>
-            <a:t> Sample </a:t>
+            <a:t> Sample 1 </a:t>
           </a:r>
-          <a:r>
-            <a:rPr lang="nl-NL" dirty="0" err="1"/>
-            <a:t>Regression</a:t>
-          </a:r>
-          <a:r>
-            <a:rPr lang="nl-NL" dirty="0"/>
-            <a:t> Analysis of Books in Giveaway</a:t>
-          </a:r>
-        </a:p>
-        <a:p>
-          <a:r>
-            <a:rPr lang="en-GB" dirty="0"/>
-            <a:t>#ratings &amp; average rating</a:t>
-          </a:r>
+          <a:endParaRPr lang="en-GB" dirty="0"/>
         </a:p>
       </dgm:t>
     </dgm:pt>
@@ -2776,7 +2763,55 @@
         </a:p>
       </dgm:t>
     </dgm:pt>
-    <dgm:pt modelId="{87E31711-0C48-4BEA-8A84-8A23EDBCAF5A}">
+    <dgm:pt modelId="{386DB09D-D8D4-4401-9513-58D8860EC432}">
+      <dgm:prSet phldrT="[Tekst]"/>
+      <dgm:spPr>
+        <a:solidFill>
+          <a:schemeClr val="accent2">
+            <a:lumMod val="60000"/>
+            <a:lumOff val="40000"/>
+          </a:schemeClr>
+        </a:solidFill>
+      </dgm:spPr>
+      <dgm:t>
+        <a:bodyPr/>
+        <a:lstStyle/>
+        <a:p>
+          <a:r>
+            <a:rPr lang="nl-NL" dirty="0"/>
+            <a:t>Review </a:t>
+          </a:r>
+          <a:r>
+            <a:rPr lang="nl-NL" dirty="0" err="1"/>
+            <a:t>text</a:t>
+          </a:r>
+          <a:endParaRPr lang="en-GB" dirty="0"/>
+        </a:p>
+      </dgm:t>
+    </dgm:pt>
+    <dgm:pt modelId="{DB529E50-41FB-488A-81A7-E63EF3441489}" type="parTrans" cxnId="{E16A8987-8A76-4717-89D9-A1774EC3E2A8}">
+      <dgm:prSet/>
+      <dgm:spPr/>
+      <dgm:t>
+        <a:bodyPr/>
+        <a:lstStyle/>
+        <a:p>
+          <a:endParaRPr lang="en-GB"/>
+        </a:p>
+      </dgm:t>
+    </dgm:pt>
+    <dgm:pt modelId="{80160354-2D72-41F1-806B-6516CA2D23B3}" type="sibTrans" cxnId="{E16A8987-8A76-4717-89D9-A1774EC3E2A8}">
+      <dgm:prSet/>
+      <dgm:spPr/>
+      <dgm:t>
+        <a:bodyPr/>
+        <a:lstStyle/>
+        <a:p>
+          <a:endParaRPr lang="en-GB"/>
+        </a:p>
+      </dgm:t>
+    </dgm:pt>
+    <dgm:pt modelId="{FD0E542C-29F9-4A68-82AA-6E674882F784}">
       <dgm:prSet phldrT="[Tekst]"/>
       <dgm:spPr>
         <a:solidFill>
@@ -2798,7 +2833,7 @@
         </a:p>
       </dgm:t>
     </dgm:pt>
-    <dgm:pt modelId="{B71321E6-326F-4688-94B1-5AB23A73EBD8}" type="parTrans" cxnId="{6DCA2E09-11DB-49EA-A9ED-D672909CD70B}">
+    <dgm:pt modelId="{05CC045E-E788-413F-953E-61B3831EB561}" type="parTrans" cxnId="{519C9964-B7FE-4D97-89A1-3749A60FB6C1}">
       <dgm:prSet/>
       <dgm:spPr/>
       <dgm:t>
@@ -2809,50 +2844,58 @@
         </a:p>
       </dgm:t>
     </dgm:pt>
-    <dgm:pt modelId="{7F635098-1F7E-4288-B5A0-5E4EA9E62EC9}" type="sibTrans" cxnId="{6DCA2E09-11DB-49EA-A9ED-D672909CD70B}">
-      <dgm:prSet custT="1"/>
+    <dgm:pt modelId="{DCA6432A-0B7A-4B13-B405-5A0CF064C550}" type="sibTrans" cxnId="{519C9964-B7FE-4D97-89A1-3749A60FB6C1}">
+      <dgm:prSet/>
       <dgm:spPr/>
       <dgm:t>
         <a:bodyPr/>
         <a:lstStyle/>
         <a:p>
-          <a:pPr algn="l">
-            <a:lnSpc>
-              <a:spcPct val="100000"/>
-            </a:lnSpc>
-          </a:pPr>
+          <a:endParaRPr lang="en-GB" dirty="0"/>
+        </a:p>
+      </dgm:t>
+    </dgm:pt>
+    <dgm:pt modelId="{32769E7A-8BB7-4673-B5F5-7DE835A92C84}">
+      <dgm:prSet phldrT="[Tekst]"/>
+      <dgm:spPr>
+        <a:solidFill>
+          <a:schemeClr val="accent4">
+            <a:lumMod val="60000"/>
+            <a:lumOff val="40000"/>
+          </a:schemeClr>
+        </a:solidFill>
+      </dgm:spPr>
+      <dgm:t>
+        <a:bodyPr/>
+        <a:lstStyle/>
+        <a:p>
           <a:r>
-            <a:rPr lang="nl-NL" sz="800" dirty="0" err="1"/>
-            <a:t>Book_id</a:t>
+            <a:rPr lang="nl-NL" dirty="0"/>
+            <a:t>Reviews</a:t>
           </a:r>
-          <a:endParaRPr lang="nl-NL" sz="800" dirty="0"/>
+          <a:endParaRPr lang="en-GB" dirty="0"/>
         </a:p>
+      </dgm:t>
+    </dgm:pt>
+    <dgm:pt modelId="{D48C5111-DFC8-4F78-858A-CAB52586E521}" type="parTrans" cxnId="{5E4CE3D4-157A-41EF-9052-2E98B5DB4B5D}">
+      <dgm:prSet/>
+      <dgm:spPr/>
+      <dgm:t>
+        <a:bodyPr/>
+        <a:lstStyle/>
         <a:p>
-          <a:pPr algn="l">
-            <a:lnSpc>
-              <a:spcPct val="100000"/>
-            </a:lnSpc>
-          </a:pPr>
-          <a:r>
-            <a:rPr lang="nl-NL" sz="800" dirty="0"/>
-            <a:t>11,742,003 reviews</a:t>
-          </a:r>
+          <a:endParaRPr lang="en-GB"/>
         </a:p>
+      </dgm:t>
+    </dgm:pt>
+    <dgm:pt modelId="{DA319B38-204C-4E1D-A9B2-41EEFCD0E55E}" type="sibTrans" cxnId="{5E4CE3D4-157A-41EF-9052-2E98B5DB4B5D}">
+      <dgm:prSet/>
+      <dgm:spPr/>
+      <dgm:t>
+        <a:bodyPr/>
+        <a:lstStyle/>
         <a:p>
-          <a:pPr algn="l">
-            <a:lnSpc>
-              <a:spcPct val="100000"/>
-            </a:lnSpc>
-          </a:pPr>
-          <a:r>
-            <a:rPr lang="nl-NL" sz="800" dirty="0"/>
-            <a:t>20,000 </a:t>
-          </a:r>
-          <a:r>
-            <a:rPr lang="nl-NL" sz="800" dirty="0" err="1"/>
-            <a:t>books</a:t>
-          </a:r>
-          <a:endParaRPr lang="en-GB" sz="800" dirty="0"/>
+          <a:endParaRPr lang="en-GB"/>
         </a:p>
       </dgm:t>
     </dgm:pt>
@@ -2900,31 +2943,31 @@
       <dgm:spPr/>
     </dgm:pt>
     <dgm:pt modelId="{5EB043FB-5105-496A-9EAA-9AF75D915352}" type="pres">
-      <dgm:prSet presAssocID="{94FA3CF0-607C-49D1-BB21-43317D4CAA3A}" presName="rootConnector1" presStyleLbl="node1" presStyleIdx="0" presStyleCnt="2"/>
+      <dgm:prSet presAssocID="{94FA3CF0-607C-49D1-BB21-43317D4CAA3A}" presName="rootConnector1" presStyleLbl="node1" presStyleIdx="0" presStyleCnt="4"/>
       <dgm:spPr/>
     </dgm:pt>
     <dgm:pt modelId="{91027392-398A-43B8-9886-81F821BE5F0A}" type="pres">
       <dgm:prSet presAssocID="{94FA3CF0-607C-49D1-BB21-43317D4CAA3A}" presName="hierChild2" presStyleCnt="0"/>
       <dgm:spPr/>
     </dgm:pt>
-    <dgm:pt modelId="{6FF0FA13-6EE4-4827-A4E7-A26EAF7D470C}" type="pres">
-      <dgm:prSet presAssocID="{B71321E6-326F-4688-94B1-5AB23A73EBD8}" presName="Name37" presStyleLbl="parChTrans1D2" presStyleIdx="0" presStyleCnt="2"/>
+    <dgm:pt modelId="{11B75242-AD64-43D8-89DE-E79D8A6D4E67}" type="pres">
+      <dgm:prSet presAssocID="{D48C5111-DFC8-4F78-858A-CAB52586E521}" presName="Name37" presStyleLbl="parChTrans1D2" presStyleIdx="0" presStyleCnt="2"/>
       <dgm:spPr/>
     </dgm:pt>
-    <dgm:pt modelId="{8AE15177-D1B1-481D-9E77-79FE4F1AED59}" type="pres">
-      <dgm:prSet presAssocID="{87E31711-0C48-4BEA-8A84-8A23EDBCAF5A}" presName="hierRoot2" presStyleCnt="0">
+    <dgm:pt modelId="{7C649822-8DC6-4683-8B24-A017362404EA}" type="pres">
+      <dgm:prSet presAssocID="{32769E7A-8BB7-4673-B5F5-7DE835A92C84}" presName="hierRoot2" presStyleCnt="0">
         <dgm:presLayoutVars>
           <dgm:hierBranch val="init"/>
         </dgm:presLayoutVars>
       </dgm:prSet>
       <dgm:spPr/>
     </dgm:pt>
-    <dgm:pt modelId="{DB8E64F3-3407-4650-A846-657428DA11C1}" type="pres">
-      <dgm:prSet presAssocID="{87E31711-0C48-4BEA-8A84-8A23EDBCAF5A}" presName="rootComposite" presStyleCnt="0"/>
+    <dgm:pt modelId="{92F463B3-4066-4E69-A5CA-63C95741475F}" type="pres">
+      <dgm:prSet presAssocID="{32769E7A-8BB7-4673-B5F5-7DE835A92C84}" presName="rootComposite" presStyleCnt="0"/>
       <dgm:spPr/>
     </dgm:pt>
-    <dgm:pt modelId="{69F93667-FB34-4FD6-9340-2A7713D8DDFD}" type="pres">
-      <dgm:prSet presAssocID="{87E31711-0C48-4BEA-8A84-8A23EDBCAF5A}" presName="rootText" presStyleLbl="node1" presStyleIdx="0" presStyleCnt="2">
+    <dgm:pt modelId="{3132696F-3398-44C6-9697-1FA25FA3E1FC}" type="pres">
+      <dgm:prSet presAssocID="{32769E7A-8BB7-4673-B5F5-7DE835A92C84}" presName="rootText" presStyleLbl="node1" presStyleIdx="0" presStyleCnt="4">
         <dgm:presLayoutVars>
           <dgm:chMax/>
           <dgm:chPref val="3"/>
@@ -2932,8 +2975,8 @@
       </dgm:prSet>
       <dgm:spPr/>
     </dgm:pt>
-    <dgm:pt modelId="{49046125-D849-4214-BFFC-FE47BC1B1054}" type="pres">
-      <dgm:prSet presAssocID="{87E31711-0C48-4BEA-8A84-8A23EDBCAF5A}" presName="titleText2" presStyleLbl="fgAcc1" presStyleIdx="0" presStyleCnt="2" custScaleY="177501">
+    <dgm:pt modelId="{63126DD4-D339-48DF-88FA-2C7ECF84F7F1}" type="pres">
+      <dgm:prSet presAssocID="{32769E7A-8BB7-4673-B5F5-7DE835A92C84}" presName="titleText2" presStyleLbl="fgAcc1" presStyleIdx="0" presStyleCnt="4">
         <dgm:presLayoutVars>
           <dgm:chMax val="0"/>
           <dgm:chPref val="0"/>
@@ -2941,16 +2984,108 @@
       </dgm:prSet>
       <dgm:spPr/>
     </dgm:pt>
-    <dgm:pt modelId="{156A34E1-71AB-4DC3-A6DB-97D4F9AD908A}" type="pres">
-      <dgm:prSet presAssocID="{87E31711-0C48-4BEA-8A84-8A23EDBCAF5A}" presName="rootConnector" presStyleLbl="node2" presStyleIdx="0" presStyleCnt="0"/>
+    <dgm:pt modelId="{1963E07A-D51B-4E6A-87FB-8059C2C9A0E4}" type="pres">
+      <dgm:prSet presAssocID="{32769E7A-8BB7-4673-B5F5-7DE835A92C84}" presName="rootConnector" presStyleLbl="node2" presStyleIdx="0" presStyleCnt="0"/>
       <dgm:spPr/>
     </dgm:pt>
-    <dgm:pt modelId="{E0966348-7978-478E-9C87-D35C0D8219FE}" type="pres">
-      <dgm:prSet presAssocID="{87E31711-0C48-4BEA-8A84-8A23EDBCAF5A}" presName="hierChild4" presStyleCnt="0"/>
+    <dgm:pt modelId="{69298DB4-EEC4-4C9A-9358-8A1355640DF5}" type="pres">
+      <dgm:prSet presAssocID="{32769E7A-8BB7-4673-B5F5-7DE835A92C84}" presName="hierChild4" presStyleCnt="0"/>
       <dgm:spPr/>
     </dgm:pt>
-    <dgm:pt modelId="{6D4FC096-B21A-487B-BDC7-A97A755FCFB5}" type="pres">
-      <dgm:prSet presAssocID="{87E31711-0C48-4BEA-8A84-8A23EDBCAF5A}" presName="hierChild5" presStyleCnt="0"/>
+    <dgm:pt modelId="{95925110-3EC3-4E4B-9F27-B6B4ECDDDE7F}" type="pres">
+      <dgm:prSet presAssocID="{05CC045E-E788-413F-953E-61B3831EB561}" presName="Name37" presStyleLbl="parChTrans1D3" presStyleIdx="0" presStyleCnt="2"/>
+      <dgm:spPr/>
+    </dgm:pt>
+    <dgm:pt modelId="{17B5DF8F-0774-4E90-AC11-2538CA0CEF70}" type="pres">
+      <dgm:prSet presAssocID="{FD0E542C-29F9-4A68-82AA-6E674882F784}" presName="hierRoot2" presStyleCnt="0">
+        <dgm:presLayoutVars>
+          <dgm:hierBranch val="init"/>
+        </dgm:presLayoutVars>
+      </dgm:prSet>
+      <dgm:spPr/>
+    </dgm:pt>
+    <dgm:pt modelId="{51F7F035-B4CE-4E2B-B446-2CD9F028A5BD}" type="pres">
+      <dgm:prSet presAssocID="{FD0E542C-29F9-4A68-82AA-6E674882F784}" presName="rootComposite" presStyleCnt="0"/>
+      <dgm:spPr/>
+    </dgm:pt>
+    <dgm:pt modelId="{5E2E93C9-0241-4510-B652-98A77FCAA800}" type="pres">
+      <dgm:prSet presAssocID="{FD0E542C-29F9-4A68-82AA-6E674882F784}" presName="rootText" presStyleLbl="node1" presStyleIdx="1" presStyleCnt="4">
+        <dgm:presLayoutVars>
+          <dgm:chMax/>
+          <dgm:chPref val="3"/>
+        </dgm:presLayoutVars>
+      </dgm:prSet>
+      <dgm:spPr/>
+    </dgm:pt>
+    <dgm:pt modelId="{4C4EA54F-25D6-4B79-993B-54C8E2FEDFCF}" type="pres">
+      <dgm:prSet presAssocID="{FD0E542C-29F9-4A68-82AA-6E674882F784}" presName="titleText2" presStyleLbl="fgAcc1" presStyleIdx="1" presStyleCnt="4">
+        <dgm:presLayoutVars>
+          <dgm:chMax val="0"/>
+          <dgm:chPref val="0"/>
+        </dgm:presLayoutVars>
+      </dgm:prSet>
+      <dgm:spPr/>
+    </dgm:pt>
+    <dgm:pt modelId="{6D956D26-F991-4C22-86D3-E26AFD193348}" type="pres">
+      <dgm:prSet presAssocID="{FD0E542C-29F9-4A68-82AA-6E674882F784}" presName="rootConnector" presStyleLbl="node3" presStyleIdx="0" presStyleCnt="0"/>
+      <dgm:spPr/>
+    </dgm:pt>
+    <dgm:pt modelId="{005AD896-B7B7-48E5-BC5F-BE67F2915A70}" type="pres">
+      <dgm:prSet presAssocID="{FD0E542C-29F9-4A68-82AA-6E674882F784}" presName="hierChild4" presStyleCnt="0"/>
+      <dgm:spPr/>
+    </dgm:pt>
+    <dgm:pt modelId="{D7AA2E2B-0131-48D7-8498-9B813020BB9F}" type="pres">
+      <dgm:prSet presAssocID="{FD0E542C-29F9-4A68-82AA-6E674882F784}" presName="hierChild5" presStyleCnt="0"/>
+      <dgm:spPr/>
+    </dgm:pt>
+    <dgm:pt modelId="{59D8E492-A63D-40BF-ABAC-7077C4B9EAAA}" type="pres">
+      <dgm:prSet presAssocID="{DB529E50-41FB-488A-81A7-E63EF3441489}" presName="Name37" presStyleLbl="parChTrans1D3" presStyleIdx="1" presStyleCnt="2"/>
+      <dgm:spPr/>
+    </dgm:pt>
+    <dgm:pt modelId="{C7514614-E003-4EEB-98DF-C6427A533322}" type="pres">
+      <dgm:prSet presAssocID="{386DB09D-D8D4-4401-9513-58D8860EC432}" presName="hierRoot2" presStyleCnt="0">
+        <dgm:presLayoutVars>
+          <dgm:hierBranch val="init"/>
+        </dgm:presLayoutVars>
+      </dgm:prSet>
+      <dgm:spPr/>
+    </dgm:pt>
+    <dgm:pt modelId="{4191BF09-B10E-4925-9D1A-3CCFFDF31674}" type="pres">
+      <dgm:prSet presAssocID="{386DB09D-D8D4-4401-9513-58D8860EC432}" presName="rootComposite" presStyleCnt="0"/>
+      <dgm:spPr/>
+    </dgm:pt>
+    <dgm:pt modelId="{641F6D4B-C949-4B07-BEFB-A64B2D62A743}" type="pres">
+      <dgm:prSet presAssocID="{386DB09D-D8D4-4401-9513-58D8860EC432}" presName="rootText" presStyleLbl="node1" presStyleIdx="2" presStyleCnt="4">
+        <dgm:presLayoutVars>
+          <dgm:chMax/>
+          <dgm:chPref val="3"/>
+        </dgm:presLayoutVars>
+      </dgm:prSet>
+      <dgm:spPr/>
+    </dgm:pt>
+    <dgm:pt modelId="{EBF22B7B-F3B1-4B4C-A89F-D3867E6B03DB}" type="pres">
+      <dgm:prSet presAssocID="{386DB09D-D8D4-4401-9513-58D8860EC432}" presName="titleText2" presStyleLbl="fgAcc1" presStyleIdx="2" presStyleCnt="4">
+        <dgm:presLayoutVars>
+          <dgm:chMax val="0"/>
+          <dgm:chPref val="0"/>
+        </dgm:presLayoutVars>
+      </dgm:prSet>
+      <dgm:spPr/>
+    </dgm:pt>
+    <dgm:pt modelId="{06CFEB82-2E44-486A-A5F4-267DEDAED37C}" type="pres">
+      <dgm:prSet presAssocID="{386DB09D-D8D4-4401-9513-58D8860EC432}" presName="rootConnector" presStyleLbl="node3" presStyleIdx="0" presStyleCnt="0"/>
+      <dgm:spPr/>
+    </dgm:pt>
+    <dgm:pt modelId="{01B1CFE7-3E6A-4BC2-9C20-889F9D3D4CA3}" type="pres">
+      <dgm:prSet presAssocID="{386DB09D-D8D4-4401-9513-58D8860EC432}" presName="hierChild4" presStyleCnt="0"/>
+      <dgm:spPr/>
+    </dgm:pt>
+    <dgm:pt modelId="{0A76CD32-6F04-48D5-A20F-AF7B1162EF31}" type="pres">
+      <dgm:prSet presAssocID="{386DB09D-D8D4-4401-9513-58D8860EC432}" presName="hierChild5" presStyleCnt="0"/>
+      <dgm:spPr/>
+    </dgm:pt>
+    <dgm:pt modelId="{1D0BB4E4-8597-44D1-BC08-F35408735ADB}" type="pres">
+      <dgm:prSet presAssocID="{32769E7A-8BB7-4673-B5F5-7DE835A92C84}" presName="hierChild5" presStyleCnt="0"/>
       <dgm:spPr/>
     </dgm:pt>
     <dgm:pt modelId="{4CE53A96-27D3-4711-8435-75D79628398F}" type="pres">
@@ -2970,7 +3105,7 @@
       <dgm:spPr/>
     </dgm:pt>
     <dgm:pt modelId="{47E73B8C-6DD0-494C-B59F-69E349C5DDFB}" type="pres">
-      <dgm:prSet presAssocID="{4F563AA0-4B9F-468B-AEF5-CF69FCB31D85}" presName="rootText" presStyleLbl="node1" presStyleIdx="1" presStyleCnt="2">
+      <dgm:prSet presAssocID="{4F563AA0-4B9F-468B-AEF5-CF69FCB31D85}" presName="rootText" presStyleLbl="node1" presStyleIdx="3" presStyleCnt="4">
         <dgm:presLayoutVars>
           <dgm:chMax/>
           <dgm:chPref val="3"/>
@@ -2979,7 +3114,7 @@
       <dgm:spPr/>
     </dgm:pt>
     <dgm:pt modelId="{7C27D4AB-ED75-41ED-BA81-DBF373CC06F2}" type="pres">
-      <dgm:prSet presAssocID="{4F563AA0-4B9F-468B-AEF5-CF69FCB31D85}" presName="titleText2" presStyleLbl="fgAcc1" presStyleIdx="1" presStyleCnt="2" custScaleY="180656">
+      <dgm:prSet presAssocID="{4F563AA0-4B9F-468B-AEF5-CF69FCB31D85}" presName="titleText2" presStyleLbl="fgAcc1" presStyleIdx="3" presStyleCnt="4" custScaleY="180656">
         <dgm:presLayoutVars>
           <dgm:chMax val="0"/>
           <dgm:chPref val="0"/>
@@ -3005,43 +3140,69 @@
     </dgm:pt>
   </dgm:ptLst>
   <dgm:cxnLst>
-    <dgm:cxn modelId="{6DCA2E09-11DB-49EA-A9ED-D672909CD70B}" srcId="{94FA3CF0-607C-49D1-BB21-43317D4CAA3A}" destId="{87E31711-0C48-4BEA-8A84-8A23EDBCAF5A}" srcOrd="0" destOrd="0" parTransId="{B71321E6-326F-4688-94B1-5AB23A73EBD8}" sibTransId="{7F635098-1F7E-4288-B5A0-5E4EA9E62EC9}"/>
-    <dgm:cxn modelId="{E9FE1E18-31FE-48E8-A41E-D7C927FD0960}" type="presOf" srcId="{87E31711-0C48-4BEA-8A84-8A23EDBCAF5A}" destId="{69F93667-FB34-4FD6-9340-2A7713D8DDFD}" srcOrd="0" destOrd="0" presId="urn:microsoft.com/office/officeart/2008/layout/NameandTitleOrganizationalChart"/>
+    <dgm:cxn modelId="{20C17217-DAF3-4527-AB78-51C7118FF9C1}" type="presOf" srcId="{05CC045E-E788-413F-953E-61B3831EB561}" destId="{95925110-3EC3-4E4B-9F27-B6B4ECDDDE7F}" srcOrd="0" destOrd="0" presId="urn:microsoft.com/office/officeart/2008/layout/NameandTitleOrganizationalChart"/>
     <dgm:cxn modelId="{10162229-CB69-43CB-86DD-9C84587DA4BD}" type="presOf" srcId="{7E3CA212-0345-4BC8-936E-70E8C5E6ACCF}" destId="{CCAD999D-3111-4293-A3CA-EBF33C8D92A2}" srcOrd="0" destOrd="0" presId="urn:microsoft.com/office/officeart/2008/layout/NameandTitleOrganizationalChart"/>
-    <dgm:cxn modelId="{730B7047-BE45-4541-9F36-0EDB2F0F2596}" type="presOf" srcId="{7167A00A-2A21-4D71-BB82-4E0D3FB0A73C}" destId="{7C27D4AB-ED75-41ED-BA81-DBF373CC06F2}" srcOrd="0" destOrd="0" presId="urn:microsoft.com/office/officeart/2008/layout/NameandTitleOrganizationalChart"/>
-    <dgm:cxn modelId="{D4A41468-0356-4CAC-853B-7C62F347F4F8}" type="presOf" srcId="{87E31711-0C48-4BEA-8A84-8A23EDBCAF5A}" destId="{156A34E1-71AB-4DC3-A6DB-97D4F9AD908A}" srcOrd="1" destOrd="0" presId="urn:microsoft.com/office/officeart/2008/layout/NameandTitleOrganizationalChart"/>
-    <dgm:cxn modelId="{25602A74-C227-4B8B-959B-EB5ADA285352}" type="presOf" srcId="{7F635098-1F7E-4288-B5A0-5E4EA9E62EC9}" destId="{49046125-D849-4214-BFFC-FE47BC1B1054}" srcOrd="0" destOrd="0" presId="urn:microsoft.com/office/officeart/2008/layout/NameandTitleOrganizationalChart"/>
+    <dgm:cxn modelId="{79C7323A-CC13-46C4-B608-0CB904D309A8}" type="presOf" srcId="{80160354-2D72-41F1-806B-6516CA2D23B3}" destId="{EBF22B7B-F3B1-4B4C-A89F-D3867E6B03DB}" srcOrd="0" destOrd="0" presId="urn:microsoft.com/office/officeart/2008/layout/NameandTitleOrganizationalChart"/>
+    <dgm:cxn modelId="{09C16B5B-287D-41D4-B07A-BC8252F31D5A}" type="presOf" srcId="{4F563AA0-4B9F-468B-AEF5-CF69FCB31D85}" destId="{0ECD952E-3CCB-4E17-9843-7B1D79CCE3A3}" srcOrd="1" destOrd="0" presId="urn:microsoft.com/office/officeart/2008/layout/NameandTitleOrganizationalChart"/>
+    <dgm:cxn modelId="{9A61EC43-F67F-4503-A87D-A288363E8849}" type="presOf" srcId="{DA319B38-204C-4E1D-A9B2-41EEFCD0E55E}" destId="{63126DD4-D339-48DF-88FA-2C7ECF84F7F1}" srcOrd="0" destOrd="0" presId="urn:microsoft.com/office/officeart/2008/layout/NameandTitleOrganizationalChart"/>
+    <dgm:cxn modelId="{519C9964-B7FE-4D97-89A1-3749A60FB6C1}" srcId="{32769E7A-8BB7-4673-B5F5-7DE835A92C84}" destId="{FD0E542C-29F9-4A68-82AA-6E674882F784}" srcOrd="0" destOrd="0" parTransId="{05CC045E-E788-413F-953E-61B3831EB561}" sibTransId="{DCA6432A-0B7A-4B13-B405-5A0CF064C550}"/>
+    <dgm:cxn modelId="{69E76055-2C88-4513-A531-EA96B3F236D4}" type="presOf" srcId="{386DB09D-D8D4-4401-9513-58D8860EC432}" destId="{641F6D4B-C949-4B07-BEFB-A64B2D62A743}" srcOrd="0" destOrd="0" presId="urn:microsoft.com/office/officeart/2008/layout/NameandTitleOrganizationalChart"/>
     <dgm:cxn modelId="{67B04375-B792-47E4-B5E1-DE9860B046DF}" type="presOf" srcId="{94FA3CF0-607C-49D1-BB21-43317D4CAA3A}" destId="{5EB043FB-5105-496A-9EAA-9AF75D915352}" srcOrd="1" destOrd="0" presId="urn:microsoft.com/office/officeart/2008/layout/NameandTitleOrganizationalChart"/>
-    <dgm:cxn modelId="{66267A75-3F5B-4E53-A270-4F6AE5EB34DE}" type="presOf" srcId="{4F563AA0-4B9F-468B-AEF5-CF69FCB31D85}" destId="{0ECD952E-3CCB-4E17-9843-7B1D79CCE3A3}" srcOrd="1" destOrd="0" presId="urn:microsoft.com/office/officeart/2008/layout/NameandTitleOrganizationalChart"/>
+    <dgm:cxn modelId="{E16A8987-8A76-4717-89D9-A1774EC3E2A8}" srcId="{32769E7A-8BB7-4673-B5F5-7DE835A92C84}" destId="{386DB09D-D8D4-4401-9513-58D8860EC432}" srcOrd="1" destOrd="0" parTransId="{DB529E50-41FB-488A-81A7-E63EF3441489}" sibTransId="{80160354-2D72-41F1-806B-6516CA2D23B3}"/>
+    <dgm:cxn modelId="{167A0C8A-0635-4799-8559-049A7BA344C8}" type="presOf" srcId="{32769E7A-8BB7-4673-B5F5-7DE835A92C84}" destId="{1963E07A-D51B-4E6A-87FB-8059C2C9A0E4}" srcOrd="1" destOrd="0" presId="urn:microsoft.com/office/officeart/2008/layout/NameandTitleOrganizationalChart"/>
     <dgm:cxn modelId="{2662E695-3735-4934-9183-449D21690DEB}" srcId="{43D34009-4C01-4707-B98D-353C34BC0B12}" destId="{94FA3CF0-607C-49D1-BB21-43317D4CAA3A}" srcOrd="0" destOrd="0" parTransId="{91D23CB3-113B-4291-A4EF-C7A98F91A955}" sibTransId="{7E3CA212-0345-4BC8-936E-70E8C5E6ACCF}"/>
-    <dgm:cxn modelId="{F4782CB4-8712-4DE4-9226-C2A2024B387C}" type="presOf" srcId="{DDCB977C-F022-4E70-9114-225B7C4AE372}" destId="{4CE53A96-27D3-4711-8435-75D79628398F}" srcOrd="0" destOrd="0" presId="urn:microsoft.com/office/officeart/2008/layout/NameandTitleOrganizationalChart"/>
-    <dgm:cxn modelId="{9DC536BE-85B4-4F4D-B019-1C4D1D4A6C81}" type="presOf" srcId="{B71321E6-326F-4688-94B1-5AB23A73EBD8}" destId="{6FF0FA13-6EE4-4827-A4E7-A26EAF7D470C}" srcOrd="0" destOrd="0" presId="urn:microsoft.com/office/officeart/2008/layout/NameandTitleOrganizationalChart"/>
+    <dgm:cxn modelId="{6C98E39E-7086-42F2-A530-C293611505B7}" type="presOf" srcId="{DCA6432A-0B7A-4B13-B405-5A0CF064C550}" destId="{4C4EA54F-25D6-4B79-993B-54C8E2FEDFCF}" srcOrd="0" destOrd="0" presId="urn:microsoft.com/office/officeart/2008/layout/NameandTitleOrganizationalChart"/>
+    <dgm:cxn modelId="{56231CA0-468D-4576-B3E4-6FB116C7641A}" type="presOf" srcId="{FD0E542C-29F9-4A68-82AA-6E674882F784}" destId="{5E2E93C9-0241-4510-B652-98A77FCAA800}" srcOrd="0" destOrd="0" presId="urn:microsoft.com/office/officeart/2008/layout/NameandTitleOrganizationalChart"/>
+    <dgm:cxn modelId="{04DDB0AB-D98D-47E9-98C6-83C6ACC0219A}" type="presOf" srcId="{D48C5111-DFC8-4F78-858A-CAB52586E521}" destId="{11B75242-AD64-43D8-89DE-E79D8A6D4E67}" srcOrd="0" destOrd="0" presId="urn:microsoft.com/office/officeart/2008/layout/NameandTitleOrganizationalChart"/>
+    <dgm:cxn modelId="{82AA07B2-71AE-4638-9B25-3177F7C4227C}" type="presOf" srcId="{7167A00A-2A21-4D71-BB82-4E0D3FB0A73C}" destId="{7C27D4AB-ED75-41ED-BA81-DBF373CC06F2}" srcOrd="0" destOrd="0" presId="urn:microsoft.com/office/officeart/2008/layout/NameandTitleOrganizationalChart"/>
+    <dgm:cxn modelId="{FE5B80C6-988F-40A0-93F6-AD540F1508C2}" type="presOf" srcId="{DDCB977C-F022-4E70-9114-225B7C4AE372}" destId="{4CE53A96-27D3-4711-8435-75D79628398F}" srcOrd="0" destOrd="0" presId="urn:microsoft.com/office/officeart/2008/layout/NameandTitleOrganizationalChart"/>
     <dgm:cxn modelId="{4559F4C7-12A8-4673-9D5F-714607627F42}" type="presOf" srcId="{94FA3CF0-607C-49D1-BB21-43317D4CAA3A}" destId="{95C771D9-DECC-41A6-9A8F-231673A5008A}" srcOrd="0" destOrd="0" presId="urn:microsoft.com/office/officeart/2008/layout/NameandTitleOrganizationalChart"/>
+    <dgm:cxn modelId="{3774D6D0-45F0-40CF-95D5-279A5EFA3FC6}" type="presOf" srcId="{FD0E542C-29F9-4A68-82AA-6E674882F784}" destId="{6D956D26-F991-4C22-86D3-E26AFD193348}" srcOrd="1" destOrd="0" presId="urn:microsoft.com/office/officeart/2008/layout/NameandTitleOrganizationalChart"/>
+    <dgm:cxn modelId="{5E4CE3D4-157A-41EF-9052-2E98B5DB4B5D}" srcId="{94FA3CF0-607C-49D1-BB21-43317D4CAA3A}" destId="{32769E7A-8BB7-4673-B5F5-7DE835A92C84}" srcOrd="0" destOrd="0" parTransId="{D48C5111-DFC8-4F78-858A-CAB52586E521}" sibTransId="{DA319B38-204C-4E1D-A9B2-41EEFCD0E55E}"/>
+    <dgm:cxn modelId="{80AC4EDC-EF00-496A-AB91-857B28463755}" type="presOf" srcId="{386DB09D-D8D4-4401-9513-58D8860EC432}" destId="{06CFEB82-2E44-486A-A5F4-267DEDAED37C}" srcOrd="1" destOrd="0" presId="urn:microsoft.com/office/officeart/2008/layout/NameandTitleOrganizationalChart"/>
     <dgm:cxn modelId="{66E912E8-1B87-4957-9D2A-110D3D4486EA}" srcId="{94FA3CF0-607C-49D1-BB21-43317D4CAA3A}" destId="{4F563AA0-4B9F-468B-AEF5-CF69FCB31D85}" srcOrd="1" destOrd="0" parTransId="{DDCB977C-F022-4E70-9114-225B7C4AE372}" sibTransId="{7167A00A-2A21-4D71-BB82-4E0D3FB0A73C}"/>
-    <dgm:cxn modelId="{5428EEEB-0D06-4E99-987A-0ADDA3603D66}" type="presOf" srcId="{4F563AA0-4B9F-468B-AEF5-CF69FCB31D85}" destId="{47E73B8C-6DD0-494C-B59F-69E349C5DDFB}" srcOrd="0" destOrd="0" presId="urn:microsoft.com/office/officeart/2008/layout/NameandTitleOrganizationalChart"/>
+    <dgm:cxn modelId="{05EBB4F2-312E-4A7D-9CE9-B3F5E748CFC7}" type="presOf" srcId="{4F563AA0-4B9F-468B-AEF5-CF69FCB31D85}" destId="{47E73B8C-6DD0-494C-B59F-69E349C5DDFB}" srcOrd="0" destOrd="0" presId="urn:microsoft.com/office/officeart/2008/layout/NameandTitleOrganizationalChart"/>
     <dgm:cxn modelId="{3B17F2F6-4D15-4AB4-9414-C2B4CCA9CF2B}" type="presOf" srcId="{43D34009-4C01-4707-B98D-353C34BC0B12}" destId="{4D34F2ED-DA0E-4072-AF08-C7AC6410D44B}" srcOrd="0" destOrd="0" presId="urn:microsoft.com/office/officeart/2008/layout/NameandTitleOrganizationalChart"/>
+    <dgm:cxn modelId="{A70C08FB-7C06-4B95-92C1-6D3CEC0582D5}" type="presOf" srcId="{32769E7A-8BB7-4673-B5F5-7DE835A92C84}" destId="{3132696F-3398-44C6-9697-1FA25FA3E1FC}" srcOrd="0" destOrd="0" presId="urn:microsoft.com/office/officeart/2008/layout/NameandTitleOrganizationalChart"/>
+    <dgm:cxn modelId="{CF96FDFD-1648-4BD2-83E4-D8CC5F747F27}" type="presOf" srcId="{DB529E50-41FB-488A-81A7-E63EF3441489}" destId="{59D8E492-A63D-40BF-ABAC-7077C4B9EAAA}" srcOrd="0" destOrd="0" presId="urn:microsoft.com/office/officeart/2008/layout/NameandTitleOrganizationalChart"/>
     <dgm:cxn modelId="{F028618D-76D0-4250-8DA0-0489B64CC724}" type="presParOf" srcId="{4D34F2ED-DA0E-4072-AF08-C7AC6410D44B}" destId="{14E9CA01-BBC9-4D0D-A8F4-9FA16CDF7F38}" srcOrd="0" destOrd="0" presId="urn:microsoft.com/office/officeart/2008/layout/NameandTitleOrganizationalChart"/>
     <dgm:cxn modelId="{DE18B13D-200E-431C-B99B-9AAE7EE93864}" type="presParOf" srcId="{14E9CA01-BBC9-4D0D-A8F4-9FA16CDF7F38}" destId="{8579DBD6-9347-4F14-B71C-E9ABB31EE9EC}" srcOrd="0" destOrd="0" presId="urn:microsoft.com/office/officeart/2008/layout/NameandTitleOrganizationalChart"/>
     <dgm:cxn modelId="{E154F79D-57F3-47E2-B9F9-0E2161E79030}" type="presParOf" srcId="{8579DBD6-9347-4F14-B71C-E9ABB31EE9EC}" destId="{95C771D9-DECC-41A6-9A8F-231673A5008A}" srcOrd="0" destOrd="0" presId="urn:microsoft.com/office/officeart/2008/layout/NameandTitleOrganizationalChart"/>
     <dgm:cxn modelId="{3D9A2272-C71B-47B1-B542-73E266B4F4CE}" type="presParOf" srcId="{8579DBD6-9347-4F14-B71C-E9ABB31EE9EC}" destId="{CCAD999D-3111-4293-A3CA-EBF33C8D92A2}" srcOrd="1" destOrd="0" presId="urn:microsoft.com/office/officeart/2008/layout/NameandTitleOrganizationalChart"/>
     <dgm:cxn modelId="{7948F710-DCE4-4E24-BE53-4C0D83C483EC}" type="presParOf" srcId="{8579DBD6-9347-4F14-B71C-E9ABB31EE9EC}" destId="{5EB043FB-5105-496A-9EAA-9AF75D915352}" srcOrd="2" destOrd="0" presId="urn:microsoft.com/office/officeart/2008/layout/NameandTitleOrganizationalChart"/>
     <dgm:cxn modelId="{6FC79711-8C8E-4F45-B67B-E1DB9E847C97}" type="presParOf" srcId="{14E9CA01-BBC9-4D0D-A8F4-9FA16CDF7F38}" destId="{91027392-398A-43B8-9886-81F821BE5F0A}" srcOrd="1" destOrd="0" presId="urn:microsoft.com/office/officeart/2008/layout/NameandTitleOrganizationalChart"/>
-    <dgm:cxn modelId="{5DA7B205-3BEC-4554-9AEB-BD04034C3D41}" type="presParOf" srcId="{91027392-398A-43B8-9886-81F821BE5F0A}" destId="{6FF0FA13-6EE4-4827-A4E7-A26EAF7D470C}" srcOrd="0" destOrd="0" presId="urn:microsoft.com/office/officeart/2008/layout/NameandTitleOrganizationalChart"/>
-    <dgm:cxn modelId="{4FAD1C07-4954-4D93-BA16-BD5624B7AD8D}" type="presParOf" srcId="{91027392-398A-43B8-9886-81F821BE5F0A}" destId="{8AE15177-D1B1-481D-9E77-79FE4F1AED59}" srcOrd="1" destOrd="0" presId="urn:microsoft.com/office/officeart/2008/layout/NameandTitleOrganizationalChart"/>
-    <dgm:cxn modelId="{8C72AEEE-B2C5-43A2-A4F8-9EBF1AD8A40A}" type="presParOf" srcId="{8AE15177-D1B1-481D-9E77-79FE4F1AED59}" destId="{DB8E64F3-3407-4650-A846-657428DA11C1}" srcOrd="0" destOrd="0" presId="urn:microsoft.com/office/officeart/2008/layout/NameandTitleOrganizationalChart"/>
-    <dgm:cxn modelId="{4C2C5488-DAF8-4182-BBCD-EB3B9398896D}" type="presParOf" srcId="{DB8E64F3-3407-4650-A846-657428DA11C1}" destId="{69F93667-FB34-4FD6-9340-2A7713D8DDFD}" srcOrd="0" destOrd="0" presId="urn:microsoft.com/office/officeart/2008/layout/NameandTitleOrganizationalChart"/>
-    <dgm:cxn modelId="{CBF103FE-BAC8-4DF9-A06D-B3CC36E4434C}" type="presParOf" srcId="{DB8E64F3-3407-4650-A846-657428DA11C1}" destId="{49046125-D849-4214-BFFC-FE47BC1B1054}" srcOrd="1" destOrd="0" presId="urn:microsoft.com/office/officeart/2008/layout/NameandTitleOrganizationalChart"/>
-    <dgm:cxn modelId="{9DF1CA94-2A2C-4DD8-8EEF-4A83068BE366}" type="presParOf" srcId="{DB8E64F3-3407-4650-A846-657428DA11C1}" destId="{156A34E1-71AB-4DC3-A6DB-97D4F9AD908A}" srcOrd="2" destOrd="0" presId="urn:microsoft.com/office/officeart/2008/layout/NameandTitleOrganizationalChart"/>
-    <dgm:cxn modelId="{1270FA8E-7D81-487D-843B-C16BC6AF574F}" type="presParOf" srcId="{8AE15177-D1B1-481D-9E77-79FE4F1AED59}" destId="{E0966348-7978-478E-9C87-D35C0D8219FE}" srcOrd="1" destOrd="0" presId="urn:microsoft.com/office/officeart/2008/layout/NameandTitleOrganizationalChart"/>
-    <dgm:cxn modelId="{00B0B7A4-E535-476A-8B32-4D6EEAD3C43E}" type="presParOf" srcId="{8AE15177-D1B1-481D-9E77-79FE4F1AED59}" destId="{6D4FC096-B21A-487B-BDC7-A97A755FCFB5}" srcOrd="2" destOrd="0" presId="urn:microsoft.com/office/officeart/2008/layout/NameandTitleOrganizationalChart"/>
-    <dgm:cxn modelId="{ABDBF10A-E4E9-469E-9A59-3BCC2EB01E89}" type="presParOf" srcId="{91027392-398A-43B8-9886-81F821BE5F0A}" destId="{4CE53A96-27D3-4711-8435-75D79628398F}" srcOrd="2" destOrd="0" presId="urn:microsoft.com/office/officeart/2008/layout/NameandTitleOrganizationalChart"/>
-    <dgm:cxn modelId="{F167118E-FD6D-45ED-8B11-BEB0636543E3}" type="presParOf" srcId="{91027392-398A-43B8-9886-81F821BE5F0A}" destId="{04E2545C-2256-47EE-A9B1-E1D8DF26B3A9}" srcOrd="3" destOrd="0" presId="urn:microsoft.com/office/officeart/2008/layout/NameandTitleOrganizationalChart"/>
-    <dgm:cxn modelId="{3B428177-6B1D-46D0-8F66-9013EC248CAC}" type="presParOf" srcId="{04E2545C-2256-47EE-A9B1-E1D8DF26B3A9}" destId="{A31DFD3F-0D37-484A-9A20-6F148D5B7A64}" srcOrd="0" destOrd="0" presId="urn:microsoft.com/office/officeart/2008/layout/NameandTitleOrganizationalChart"/>
-    <dgm:cxn modelId="{8CADF818-662A-4794-B138-638DEE7445C0}" type="presParOf" srcId="{A31DFD3F-0D37-484A-9A20-6F148D5B7A64}" destId="{47E73B8C-6DD0-494C-B59F-69E349C5DDFB}" srcOrd="0" destOrd="0" presId="urn:microsoft.com/office/officeart/2008/layout/NameandTitleOrganizationalChart"/>
-    <dgm:cxn modelId="{25E43DCB-EDF7-4458-A5B8-7C66942835DA}" type="presParOf" srcId="{A31DFD3F-0D37-484A-9A20-6F148D5B7A64}" destId="{7C27D4AB-ED75-41ED-BA81-DBF373CC06F2}" srcOrd="1" destOrd="0" presId="urn:microsoft.com/office/officeart/2008/layout/NameandTitleOrganizationalChart"/>
-    <dgm:cxn modelId="{31B195A5-189F-4ABC-BC53-74610B668360}" type="presParOf" srcId="{A31DFD3F-0D37-484A-9A20-6F148D5B7A64}" destId="{0ECD952E-3CCB-4E17-9843-7B1D79CCE3A3}" srcOrd="2" destOrd="0" presId="urn:microsoft.com/office/officeart/2008/layout/NameandTitleOrganizationalChart"/>
-    <dgm:cxn modelId="{605CA526-F023-4B8E-8070-D0F2FC3BD3E1}" type="presParOf" srcId="{04E2545C-2256-47EE-A9B1-E1D8DF26B3A9}" destId="{FCE7BD31-BFE8-4E6E-8CC0-FCF5CA17F667}" srcOrd="1" destOrd="0" presId="urn:microsoft.com/office/officeart/2008/layout/NameandTitleOrganizationalChart"/>
-    <dgm:cxn modelId="{DDE55F9F-55A3-4494-8D71-5BB39ADF6685}" type="presParOf" srcId="{04E2545C-2256-47EE-A9B1-E1D8DF26B3A9}" destId="{EE066520-B052-4212-984B-D2DA8E3E2FEB}" srcOrd="2" destOrd="0" presId="urn:microsoft.com/office/officeart/2008/layout/NameandTitleOrganizationalChart"/>
+    <dgm:cxn modelId="{3D6AE42A-899E-409C-806F-921E22463AD1}" type="presParOf" srcId="{91027392-398A-43B8-9886-81F821BE5F0A}" destId="{11B75242-AD64-43D8-89DE-E79D8A6D4E67}" srcOrd="0" destOrd="0" presId="urn:microsoft.com/office/officeart/2008/layout/NameandTitleOrganizationalChart"/>
+    <dgm:cxn modelId="{A43CBE72-4A17-4ED1-A057-850504B393AE}" type="presParOf" srcId="{91027392-398A-43B8-9886-81F821BE5F0A}" destId="{7C649822-8DC6-4683-8B24-A017362404EA}" srcOrd="1" destOrd="0" presId="urn:microsoft.com/office/officeart/2008/layout/NameandTitleOrganizationalChart"/>
+    <dgm:cxn modelId="{E3E9D752-F1C6-4B9E-BB77-0EE0BDD83D00}" type="presParOf" srcId="{7C649822-8DC6-4683-8B24-A017362404EA}" destId="{92F463B3-4066-4E69-A5CA-63C95741475F}" srcOrd="0" destOrd="0" presId="urn:microsoft.com/office/officeart/2008/layout/NameandTitleOrganizationalChart"/>
+    <dgm:cxn modelId="{FC7CDB63-44E3-4601-A892-40B394C9DC57}" type="presParOf" srcId="{92F463B3-4066-4E69-A5CA-63C95741475F}" destId="{3132696F-3398-44C6-9697-1FA25FA3E1FC}" srcOrd="0" destOrd="0" presId="urn:microsoft.com/office/officeart/2008/layout/NameandTitleOrganizationalChart"/>
+    <dgm:cxn modelId="{58831D00-70F9-4EF6-A705-C8A3E190EF13}" type="presParOf" srcId="{92F463B3-4066-4E69-A5CA-63C95741475F}" destId="{63126DD4-D339-48DF-88FA-2C7ECF84F7F1}" srcOrd="1" destOrd="0" presId="urn:microsoft.com/office/officeart/2008/layout/NameandTitleOrganizationalChart"/>
+    <dgm:cxn modelId="{F4D16D99-F339-46EB-930E-45668A43B6EB}" type="presParOf" srcId="{92F463B3-4066-4E69-A5CA-63C95741475F}" destId="{1963E07A-D51B-4E6A-87FB-8059C2C9A0E4}" srcOrd="2" destOrd="0" presId="urn:microsoft.com/office/officeart/2008/layout/NameandTitleOrganizationalChart"/>
+    <dgm:cxn modelId="{310A67A1-38E5-4F0B-BC06-29D5F31AA12C}" type="presParOf" srcId="{7C649822-8DC6-4683-8B24-A017362404EA}" destId="{69298DB4-EEC4-4C9A-9358-8A1355640DF5}" srcOrd="1" destOrd="0" presId="urn:microsoft.com/office/officeart/2008/layout/NameandTitleOrganizationalChart"/>
+    <dgm:cxn modelId="{3B6ACABF-4BB5-4587-BDA9-56DBF4424ABE}" type="presParOf" srcId="{69298DB4-EEC4-4C9A-9358-8A1355640DF5}" destId="{95925110-3EC3-4E4B-9F27-B6B4ECDDDE7F}" srcOrd="0" destOrd="0" presId="urn:microsoft.com/office/officeart/2008/layout/NameandTitleOrganizationalChart"/>
+    <dgm:cxn modelId="{FE73CEFB-0B5A-4037-A437-61ABCB310F7C}" type="presParOf" srcId="{69298DB4-EEC4-4C9A-9358-8A1355640DF5}" destId="{17B5DF8F-0774-4E90-AC11-2538CA0CEF70}" srcOrd="1" destOrd="0" presId="urn:microsoft.com/office/officeart/2008/layout/NameandTitleOrganizationalChart"/>
+    <dgm:cxn modelId="{25672BF6-BFB3-4DF5-B90B-0E35200C197F}" type="presParOf" srcId="{17B5DF8F-0774-4E90-AC11-2538CA0CEF70}" destId="{51F7F035-B4CE-4E2B-B446-2CD9F028A5BD}" srcOrd="0" destOrd="0" presId="urn:microsoft.com/office/officeart/2008/layout/NameandTitleOrganizationalChart"/>
+    <dgm:cxn modelId="{E2147C63-E580-4568-9295-E910056891A0}" type="presParOf" srcId="{51F7F035-B4CE-4E2B-B446-2CD9F028A5BD}" destId="{5E2E93C9-0241-4510-B652-98A77FCAA800}" srcOrd="0" destOrd="0" presId="urn:microsoft.com/office/officeart/2008/layout/NameandTitleOrganizationalChart"/>
+    <dgm:cxn modelId="{C4B5793D-FFD4-4427-94F8-F1FF869B9B96}" type="presParOf" srcId="{51F7F035-B4CE-4E2B-B446-2CD9F028A5BD}" destId="{4C4EA54F-25D6-4B79-993B-54C8E2FEDFCF}" srcOrd="1" destOrd="0" presId="urn:microsoft.com/office/officeart/2008/layout/NameandTitleOrganizationalChart"/>
+    <dgm:cxn modelId="{B2CBB212-57FF-4DB2-94D3-D05EEF9906DC}" type="presParOf" srcId="{51F7F035-B4CE-4E2B-B446-2CD9F028A5BD}" destId="{6D956D26-F991-4C22-86D3-E26AFD193348}" srcOrd="2" destOrd="0" presId="urn:microsoft.com/office/officeart/2008/layout/NameandTitleOrganizationalChart"/>
+    <dgm:cxn modelId="{F32FB7AA-49A0-4303-85ED-DE75F11003D9}" type="presParOf" srcId="{17B5DF8F-0774-4E90-AC11-2538CA0CEF70}" destId="{005AD896-B7B7-48E5-BC5F-BE67F2915A70}" srcOrd="1" destOrd="0" presId="urn:microsoft.com/office/officeart/2008/layout/NameandTitleOrganizationalChart"/>
+    <dgm:cxn modelId="{2ED9AB8A-229B-4BE8-8B63-CF43627E0A99}" type="presParOf" srcId="{17B5DF8F-0774-4E90-AC11-2538CA0CEF70}" destId="{D7AA2E2B-0131-48D7-8498-9B813020BB9F}" srcOrd="2" destOrd="0" presId="urn:microsoft.com/office/officeart/2008/layout/NameandTitleOrganizationalChart"/>
+    <dgm:cxn modelId="{A2D359C9-37A6-4EEF-9021-91A245212CFE}" type="presParOf" srcId="{69298DB4-EEC4-4C9A-9358-8A1355640DF5}" destId="{59D8E492-A63D-40BF-ABAC-7077C4B9EAAA}" srcOrd="2" destOrd="0" presId="urn:microsoft.com/office/officeart/2008/layout/NameandTitleOrganizationalChart"/>
+    <dgm:cxn modelId="{0A0CBE49-D66B-4920-A577-708F0F8767F4}" type="presParOf" srcId="{69298DB4-EEC4-4C9A-9358-8A1355640DF5}" destId="{C7514614-E003-4EEB-98DF-C6427A533322}" srcOrd="3" destOrd="0" presId="urn:microsoft.com/office/officeart/2008/layout/NameandTitleOrganizationalChart"/>
+    <dgm:cxn modelId="{6450247E-0F8D-428C-A6ED-36706E9EA7E0}" type="presParOf" srcId="{C7514614-E003-4EEB-98DF-C6427A533322}" destId="{4191BF09-B10E-4925-9D1A-3CCFFDF31674}" srcOrd="0" destOrd="0" presId="urn:microsoft.com/office/officeart/2008/layout/NameandTitleOrganizationalChart"/>
+    <dgm:cxn modelId="{FEAAEFF1-F96A-4507-9FB7-F0C44C34F020}" type="presParOf" srcId="{4191BF09-B10E-4925-9D1A-3CCFFDF31674}" destId="{641F6D4B-C949-4B07-BEFB-A64B2D62A743}" srcOrd="0" destOrd="0" presId="urn:microsoft.com/office/officeart/2008/layout/NameandTitleOrganizationalChart"/>
+    <dgm:cxn modelId="{A7CEB249-4FFF-4F9C-B4D2-D9D55A4B6D0B}" type="presParOf" srcId="{4191BF09-B10E-4925-9D1A-3CCFFDF31674}" destId="{EBF22B7B-F3B1-4B4C-A89F-D3867E6B03DB}" srcOrd="1" destOrd="0" presId="urn:microsoft.com/office/officeart/2008/layout/NameandTitleOrganizationalChart"/>
+    <dgm:cxn modelId="{2350A134-7F0A-4B4B-934A-2AA41B148D3D}" type="presParOf" srcId="{4191BF09-B10E-4925-9D1A-3CCFFDF31674}" destId="{06CFEB82-2E44-486A-A5F4-267DEDAED37C}" srcOrd="2" destOrd="0" presId="urn:microsoft.com/office/officeart/2008/layout/NameandTitleOrganizationalChart"/>
+    <dgm:cxn modelId="{069D65CD-9EF8-459E-BB1C-D805885BF7CF}" type="presParOf" srcId="{C7514614-E003-4EEB-98DF-C6427A533322}" destId="{01B1CFE7-3E6A-4BC2-9C20-889F9D3D4CA3}" srcOrd="1" destOrd="0" presId="urn:microsoft.com/office/officeart/2008/layout/NameandTitleOrganizationalChart"/>
+    <dgm:cxn modelId="{FC93B09C-500F-4859-A04A-B9EF5ADED6F2}" type="presParOf" srcId="{C7514614-E003-4EEB-98DF-C6427A533322}" destId="{0A76CD32-6F04-48D5-A20F-AF7B1162EF31}" srcOrd="2" destOrd="0" presId="urn:microsoft.com/office/officeart/2008/layout/NameandTitleOrganizationalChart"/>
+    <dgm:cxn modelId="{83D75230-FBBA-4233-A9CA-219A6FBB87AF}" type="presParOf" srcId="{7C649822-8DC6-4683-8B24-A017362404EA}" destId="{1D0BB4E4-8597-44D1-BC08-F35408735ADB}" srcOrd="2" destOrd="0" presId="urn:microsoft.com/office/officeart/2008/layout/NameandTitleOrganizationalChart"/>
+    <dgm:cxn modelId="{1E1FC458-6125-4130-BC92-CA7C7E222283}" type="presParOf" srcId="{91027392-398A-43B8-9886-81F821BE5F0A}" destId="{4CE53A96-27D3-4711-8435-75D79628398F}" srcOrd="2" destOrd="0" presId="urn:microsoft.com/office/officeart/2008/layout/NameandTitleOrganizationalChart"/>
+    <dgm:cxn modelId="{D0A19354-B067-40E0-9CA4-8B01B73CE9B1}" type="presParOf" srcId="{91027392-398A-43B8-9886-81F821BE5F0A}" destId="{04E2545C-2256-47EE-A9B1-E1D8DF26B3A9}" srcOrd="3" destOrd="0" presId="urn:microsoft.com/office/officeart/2008/layout/NameandTitleOrganizationalChart"/>
+    <dgm:cxn modelId="{2885F55B-4E69-4480-8BD0-73557DEF81F1}" type="presParOf" srcId="{04E2545C-2256-47EE-A9B1-E1D8DF26B3A9}" destId="{A31DFD3F-0D37-484A-9A20-6F148D5B7A64}" srcOrd="0" destOrd="0" presId="urn:microsoft.com/office/officeart/2008/layout/NameandTitleOrganizationalChart"/>
+    <dgm:cxn modelId="{41409820-A4AB-4ADC-9163-E63B805C8F03}" type="presParOf" srcId="{A31DFD3F-0D37-484A-9A20-6F148D5B7A64}" destId="{47E73B8C-6DD0-494C-B59F-69E349C5DDFB}" srcOrd="0" destOrd="0" presId="urn:microsoft.com/office/officeart/2008/layout/NameandTitleOrganizationalChart"/>
+    <dgm:cxn modelId="{74AF0498-870D-4AD1-A14D-DD731CDBB739}" type="presParOf" srcId="{A31DFD3F-0D37-484A-9A20-6F148D5B7A64}" destId="{7C27D4AB-ED75-41ED-BA81-DBF373CC06F2}" srcOrd="1" destOrd="0" presId="urn:microsoft.com/office/officeart/2008/layout/NameandTitleOrganizationalChart"/>
+    <dgm:cxn modelId="{98153D66-56E4-49D2-ACB8-44619A2C5CEC}" type="presParOf" srcId="{A31DFD3F-0D37-484A-9A20-6F148D5B7A64}" destId="{0ECD952E-3CCB-4E17-9843-7B1D79CCE3A3}" srcOrd="2" destOrd="0" presId="urn:microsoft.com/office/officeart/2008/layout/NameandTitleOrganizationalChart"/>
+    <dgm:cxn modelId="{074C06C6-A727-4BBF-B104-6BAE2BC470FD}" type="presParOf" srcId="{04E2545C-2256-47EE-A9B1-E1D8DF26B3A9}" destId="{FCE7BD31-BFE8-4E6E-8CC0-FCF5CA17F667}" srcOrd="1" destOrd="0" presId="urn:microsoft.com/office/officeart/2008/layout/NameandTitleOrganizationalChart"/>
+    <dgm:cxn modelId="{F37A0BEA-0261-4EEB-B605-0460AAC88DF0}" type="presParOf" srcId="{04E2545C-2256-47EE-A9B1-E1D8DF26B3A9}" destId="{EE066520-B052-4212-984B-D2DA8E3E2FEB}" srcOrd="2" destOrd="0" presId="urn:microsoft.com/office/officeart/2008/layout/NameandTitleOrganizationalChart"/>
     <dgm:cxn modelId="{37485A67-8686-460D-8DFC-CFB9B9C83785}" type="presParOf" srcId="{14E9CA01-BBC9-4D0D-A8F4-9FA16CDF7F38}" destId="{C7D2604A-5F29-461C-B0AF-284B96FFDDCC}" srcOrd="2" destOrd="0" presId="urn:microsoft.com/office/officeart/2008/layout/NameandTitleOrganizationalChart"/>
   </dgm:cxnLst>
   <dgm:bg/>
@@ -4938,8 +5099,8 @@
       </dsp:nvSpPr>
       <dsp:spPr>
         <a:xfrm>
-          <a:off x="4268457" y="1858480"/>
-          <a:ext cx="2435146" cy="1394288"/>
+          <a:off x="5215182" y="1379110"/>
+          <a:ext cx="1807033" cy="798754"/>
         </a:xfrm>
         <a:custGeom>
           <a:avLst/>
@@ -4953,13 +5114,13 @@
                 <a:pt x="0" y="0"/>
               </a:moveTo>
               <a:lnTo>
-                <a:pt x="0" y="960642"/>
+                <a:pt x="0" y="476962"/>
               </a:lnTo>
               <a:lnTo>
-                <a:pt x="2435146" y="960642"/>
+                <a:pt x="1807033" y="476962"/>
               </a:lnTo>
               <a:lnTo>
-                <a:pt x="2435146" y="1394288"/>
+                <a:pt x="1807033" y="798754"/>
               </a:lnTo>
             </a:path>
           </a:pathLst>
@@ -4993,15 +5154,15 @@
         <a:fontRef idx="minor"/>
       </dsp:style>
     </dsp:sp>
-    <dsp:sp modelId="{6FF0FA13-6EE4-4827-A4E7-A26EAF7D470C}">
+    <dsp:sp modelId="{59D8E492-A63D-40BF-ABAC-7077C4B9EAAA}">
       <dsp:nvSpPr>
         <dsp:cNvPr id="0" name=""/>
         <dsp:cNvSpPr/>
       </dsp:nvSpPr>
       <dsp:spPr>
         <a:xfrm>
-          <a:off x="1887871" y="1858480"/>
-          <a:ext cx="2380586" cy="1394288"/>
+          <a:off x="3448635" y="3556976"/>
+          <a:ext cx="1786790" cy="796819"/>
         </a:xfrm>
         <a:custGeom>
           <a:avLst/>
@@ -5012,16 +5173,140 @@
           <a:pathLst>
             <a:path>
               <a:moveTo>
-                <a:pt x="2380586" y="0"/>
+                <a:pt x="0" y="0"/>
               </a:moveTo>
               <a:lnTo>
-                <a:pt x="2380586" y="960642"/>
+                <a:pt x="0" y="475026"/>
               </a:lnTo>
               <a:lnTo>
-                <a:pt x="0" y="960642"/>
+                <a:pt x="1786790" y="475026"/>
               </a:lnTo>
               <a:lnTo>
-                <a:pt x="0" y="1394288"/>
+                <a:pt x="1786790" y="796819"/>
+              </a:lnTo>
+            </a:path>
+          </a:pathLst>
+        </a:custGeom>
+        <a:noFill/>
+        <a:ln w="12700" cap="flat" cmpd="sng" algn="ctr">
+          <a:solidFill>
+            <a:schemeClr val="accent1">
+              <a:shade val="80000"/>
+              <a:hueOff val="0"/>
+              <a:satOff val="0"/>
+              <a:lumOff val="0"/>
+              <a:alphaOff val="0"/>
+            </a:schemeClr>
+          </a:solidFill>
+          <a:prstDash val="solid"/>
+          <a:miter lim="800000"/>
+        </a:ln>
+        <a:effectLst/>
+      </dsp:spPr>
+      <dsp:style>
+        <a:lnRef idx="2">
+          <a:scrgbClr r="0" g="0" b="0"/>
+        </a:lnRef>
+        <a:fillRef idx="0">
+          <a:scrgbClr r="0" g="0" b="0"/>
+        </a:fillRef>
+        <a:effectRef idx="0">
+          <a:scrgbClr r="0" g="0" b="0"/>
+        </a:effectRef>
+        <a:fontRef idx="minor"/>
+      </dsp:style>
+    </dsp:sp>
+    <dsp:sp modelId="{95925110-3EC3-4E4B-9F27-B6B4ECDDDE7F}">
+      <dsp:nvSpPr>
+        <dsp:cNvPr id="0" name=""/>
+        <dsp:cNvSpPr/>
+      </dsp:nvSpPr>
+      <dsp:spPr>
+        <a:xfrm>
+          <a:off x="1661845" y="3556976"/>
+          <a:ext cx="1786790" cy="796819"/>
+        </a:xfrm>
+        <a:custGeom>
+          <a:avLst/>
+          <a:gdLst/>
+          <a:ahLst/>
+          <a:cxnLst/>
+          <a:rect l="0" t="0" r="0" b="0"/>
+          <a:pathLst>
+            <a:path>
+              <a:moveTo>
+                <a:pt x="1786790" y="0"/>
+              </a:moveTo>
+              <a:lnTo>
+                <a:pt x="1786790" y="475026"/>
+              </a:lnTo>
+              <a:lnTo>
+                <a:pt x="0" y="475026"/>
+              </a:lnTo>
+              <a:lnTo>
+                <a:pt x="0" y="796819"/>
+              </a:lnTo>
+            </a:path>
+          </a:pathLst>
+        </a:custGeom>
+        <a:noFill/>
+        <a:ln w="12700" cap="flat" cmpd="sng" algn="ctr">
+          <a:solidFill>
+            <a:schemeClr val="accent1">
+              <a:shade val="80000"/>
+              <a:hueOff val="0"/>
+              <a:satOff val="0"/>
+              <a:lumOff val="0"/>
+              <a:alphaOff val="0"/>
+            </a:schemeClr>
+          </a:solidFill>
+          <a:prstDash val="solid"/>
+          <a:miter lim="800000"/>
+        </a:ln>
+        <a:effectLst/>
+      </dsp:spPr>
+      <dsp:style>
+        <a:lnRef idx="2">
+          <a:scrgbClr r="0" g="0" b="0"/>
+        </a:lnRef>
+        <a:fillRef idx="0">
+          <a:scrgbClr r="0" g="0" b="0"/>
+        </a:fillRef>
+        <a:effectRef idx="0">
+          <a:scrgbClr r="0" g="0" b="0"/>
+        </a:effectRef>
+        <a:fontRef idx="minor"/>
+      </dsp:style>
+    </dsp:sp>
+    <dsp:sp modelId="{11B75242-AD64-43D8-89DE-E79D8A6D4E67}">
+      <dsp:nvSpPr>
+        <dsp:cNvPr id="0" name=""/>
+        <dsp:cNvSpPr/>
+      </dsp:nvSpPr>
+      <dsp:spPr>
+        <a:xfrm>
+          <a:off x="3448635" y="1379110"/>
+          <a:ext cx="1766546" cy="798754"/>
+        </a:xfrm>
+        <a:custGeom>
+          <a:avLst/>
+          <a:gdLst/>
+          <a:ahLst/>
+          <a:cxnLst/>
+          <a:rect l="0" t="0" r="0" b="0"/>
+          <a:pathLst>
+            <a:path>
+              <a:moveTo>
+                <a:pt x="1766546" y="0"/>
+              </a:moveTo>
+              <a:lnTo>
+                <a:pt x="1766546" y="476962"/>
+              </a:lnTo>
+              <a:lnTo>
+                <a:pt x="0" y="476962"/>
+              </a:lnTo>
+              <a:lnTo>
+                <a:pt x="0" y="798754"/>
               </a:lnTo>
             </a:path>
           </a:pathLst>
@@ -5062,8 +5347,8 @@
       </dsp:nvSpPr>
       <dsp:spPr>
         <a:xfrm>
-          <a:off x="2473711" y="0"/>
-          <a:ext cx="3589493" cy="1858480"/>
+          <a:off x="3883366" y="0"/>
+          <a:ext cx="2663631" cy="1379110"/>
         </a:xfrm>
         <a:prstGeom prst="rect">
           <a:avLst/>
@@ -5103,12 +5388,12 @@
         </a:fontRef>
       </dsp:style>
       <dsp:txBody>
-        <a:bodyPr spcFirstLastPara="0" vert="horz" wrap="square" lIns="15875" tIns="15875" rIns="15875" bIns="262252" numCol="1" spcCol="1270" anchor="ctr" anchorCtr="0">
+        <a:bodyPr spcFirstLastPara="0" vert="horz" wrap="square" lIns="26035" tIns="26035" rIns="26035" bIns="194608" numCol="1" spcCol="1270" anchor="ctr" anchorCtr="0">
           <a:noAutofit/>
         </a:bodyPr>
         <a:lstStyle/>
         <a:p>
-          <a:pPr marL="0" lvl="0" indent="0" algn="ctr" defTabSz="1111250">
+          <a:pPr marL="0" lvl="0" indent="0" algn="ctr" defTabSz="1822450">
             <a:lnSpc>
               <a:spcPct val="90000"/>
             </a:lnSpc>
@@ -5121,44 +5406,19 @@
             <a:buNone/>
           </a:pPr>
           <a:r>
-            <a:rPr lang="nl-NL" sz="2500" kern="1200" dirty="0" err="1"/>
+            <a:rPr lang="nl-NL" sz="4100" kern="1200" dirty="0" err="1"/>
             <a:t>Estimation</a:t>
           </a:r>
           <a:r>
-            <a:rPr lang="nl-NL" sz="2500" kern="1200" dirty="0"/>
-            <a:t> Sample </a:t>
+            <a:rPr lang="nl-NL" sz="4100" kern="1200" dirty="0"/>
+            <a:t> Sample 1 </a:t>
           </a:r>
-          <a:r>
-            <a:rPr lang="nl-NL" sz="2500" kern="1200" dirty="0" err="1"/>
-            <a:t>Regression</a:t>
-          </a:r>
-          <a:r>
-            <a:rPr lang="nl-NL" sz="2500" kern="1200" dirty="0"/>
-            <a:t> Analysis of Books in Giveaway</a:t>
-          </a:r>
-        </a:p>
-        <a:p>
-          <a:pPr marL="0" lvl="0" indent="0" algn="ctr" defTabSz="1111250">
-            <a:lnSpc>
-              <a:spcPct val="90000"/>
-            </a:lnSpc>
-            <a:spcBef>
-              <a:spcPct val="0"/>
-            </a:spcBef>
-            <a:spcAft>
-              <a:spcPct val="35000"/>
-            </a:spcAft>
-            <a:buNone/>
-          </a:pPr>
-          <a:r>
-            <a:rPr lang="en-GB" sz="2500" kern="1200" dirty="0"/>
-            <a:t>#ratings &amp; average rating</a:t>
-          </a:r>
+          <a:endParaRPr lang="en-GB" sz="4100" kern="1200" dirty="0"/>
         </a:p>
       </dsp:txBody>
       <dsp:txXfrm>
-        <a:off x="2473711" y="0"/>
-        <a:ext cx="3589493" cy="1858480"/>
+        <a:off x="3883366" y="0"/>
+        <a:ext cx="2663631" cy="1379110"/>
       </dsp:txXfrm>
     </dsp:sp>
     <dsp:sp modelId="{CCAD999D-3111-4293-A3CA-EBF33C8D92A2}">
@@ -5168,8 +5428,8 @@
       </dsp:nvSpPr>
       <dsp:spPr>
         <a:xfrm>
-          <a:off x="3218889" y="1765984"/>
-          <a:ext cx="3230544" cy="619493"/>
+          <a:off x="4436336" y="1074576"/>
+          <a:ext cx="2397268" cy="459703"/>
         </a:xfrm>
         <a:prstGeom prst="rect">
           <a:avLst/>
@@ -5279,25 +5539,25 @@
         </a:p>
       </dsp:txBody>
       <dsp:txXfrm>
-        <a:off x="3218889" y="1765984"/>
-        <a:ext cx="3230544" cy="619493"/>
+        <a:off x="4436336" y="1074576"/>
+        <a:ext cx="2397268" cy="459703"/>
       </dsp:txXfrm>
     </dsp:sp>
-    <dsp:sp modelId="{69F93667-FB34-4FD6-9340-2A7713D8DDFD}">
+    <dsp:sp modelId="{3132696F-3398-44C6-9697-1FA25FA3E1FC}">
       <dsp:nvSpPr>
         <dsp:cNvPr id="0" name=""/>
         <dsp:cNvSpPr/>
       </dsp:nvSpPr>
       <dsp:spPr>
         <a:xfrm>
-          <a:off x="93124" y="3252768"/>
-          <a:ext cx="3589493" cy="1858480"/>
+          <a:off x="2116819" y="2177865"/>
+          <a:ext cx="2663631" cy="1379110"/>
         </a:xfrm>
         <a:prstGeom prst="rect">
           <a:avLst/>
         </a:prstGeom>
         <a:solidFill>
-          <a:schemeClr val="accent2">
+          <a:schemeClr val="accent4">
             <a:lumMod val="60000"/>
             <a:lumOff val="40000"/>
           </a:schemeClr>
@@ -5331,12 +5591,12 @@
         </a:fontRef>
       </dsp:style>
       <dsp:txBody>
-        <a:bodyPr spcFirstLastPara="0" vert="horz" wrap="square" lIns="15875" tIns="15875" rIns="15875" bIns="262252" numCol="1" spcCol="1270" anchor="ctr" anchorCtr="0">
+        <a:bodyPr spcFirstLastPara="0" vert="horz" wrap="square" lIns="26035" tIns="26035" rIns="26035" bIns="194608" numCol="1" spcCol="1270" anchor="ctr" anchorCtr="0">
           <a:noAutofit/>
         </a:bodyPr>
         <a:lstStyle/>
         <a:p>
-          <a:pPr marL="0" lvl="0" indent="0" algn="ctr" defTabSz="1111250">
+          <a:pPr marL="0" lvl="0" indent="0" algn="ctr" defTabSz="1822450">
             <a:lnSpc>
               <a:spcPct val="90000"/>
             </a:lnSpc>
@@ -5349,26 +5609,26 @@
             <a:buNone/>
           </a:pPr>
           <a:r>
-            <a:rPr lang="nl-NL" sz="2500" kern="1200" dirty="0"/>
-            <a:t>Ratings</a:t>
+            <a:rPr lang="nl-NL" sz="4100" kern="1200" dirty="0"/>
+            <a:t>Reviews</a:t>
           </a:r>
-          <a:endParaRPr lang="en-GB" sz="2500" kern="1200" dirty="0"/>
+          <a:endParaRPr lang="en-GB" sz="4100" kern="1200" dirty="0"/>
         </a:p>
       </dsp:txBody>
       <dsp:txXfrm>
-        <a:off x="93124" y="3252768"/>
-        <a:ext cx="3589493" cy="1858480"/>
+        <a:off x="2116819" y="2177865"/>
+        <a:ext cx="2663631" cy="1379110"/>
       </dsp:txXfrm>
     </dsp:sp>
-    <dsp:sp modelId="{49046125-D849-4214-BFFC-FE47BC1B1054}">
+    <dsp:sp modelId="{63126DD4-D339-48DF-88FA-2C7ECF84F7F1}">
       <dsp:nvSpPr>
         <dsp:cNvPr id="0" name=""/>
         <dsp:cNvSpPr/>
       </dsp:nvSpPr>
       <dsp:spPr>
         <a:xfrm>
-          <a:off x="811023" y="4458196"/>
-          <a:ext cx="3230544" cy="1099607"/>
+          <a:off x="2649546" y="3250507"/>
+          <a:ext cx="2397268" cy="459703"/>
         </a:xfrm>
         <a:prstGeom prst="rect">
           <a:avLst/>
@@ -5409,14 +5669,87 @@
         <a:fontRef idx="minor"/>
       </dsp:style>
       <dsp:txBody>
-        <a:bodyPr spcFirstLastPara="0" vert="horz" wrap="square" lIns="20320" tIns="5080" rIns="20320" bIns="5080" numCol="1" spcCol="1270" anchor="ctr" anchorCtr="0">
+        <a:bodyPr spcFirstLastPara="0" vert="horz" wrap="square" lIns="76200" tIns="19050" rIns="76200" bIns="19050" numCol="1" spcCol="1270" anchor="ctr" anchorCtr="0">
           <a:noAutofit/>
         </a:bodyPr>
         <a:lstStyle/>
         <a:p>
-          <a:pPr marL="0" lvl="0" indent="0" algn="l" defTabSz="355600">
+          <a:pPr marL="0" lvl="0" indent="0" algn="r" defTabSz="1333500">
             <a:lnSpc>
-              <a:spcPct val="100000"/>
+              <a:spcPct val="90000"/>
+            </a:lnSpc>
+            <a:spcBef>
+              <a:spcPct val="0"/>
+            </a:spcBef>
+            <a:spcAft>
+              <a:spcPct val="35000"/>
+            </a:spcAft>
+            <a:buNone/>
+          </a:pPr>
+          <a:endParaRPr lang="en-GB" sz="3000" kern="1200"/>
+        </a:p>
+      </dsp:txBody>
+      <dsp:txXfrm>
+        <a:off x="2649546" y="3250507"/>
+        <a:ext cx="2397268" cy="459703"/>
+      </dsp:txXfrm>
+    </dsp:sp>
+    <dsp:sp modelId="{5E2E93C9-0241-4510-B652-98A77FCAA800}">
+      <dsp:nvSpPr>
+        <dsp:cNvPr id="0" name=""/>
+        <dsp:cNvSpPr/>
+      </dsp:nvSpPr>
+      <dsp:spPr>
+        <a:xfrm>
+          <a:off x="330029" y="4353795"/>
+          <a:ext cx="2663631" cy="1379110"/>
+        </a:xfrm>
+        <a:prstGeom prst="rect">
+          <a:avLst/>
+        </a:prstGeom>
+        <a:solidFill>
+          <a:schemeClr val="accent2">
+            <a:lumMod val="60000"/>
+            <a:lumOff val="40000"/>
+          </a:schemeClr>
+        </a:solidFill>
+        <a:ln w="12700" cap="flat" cmpd="sng" algn="ctr">
+          <a:solidFill>
+            <a:schemeClr val="lt1">
+              <a:hueOff val="0"/>
+              <a:satOff val="0"/>
+              <a:lumOff val="0"/>
+              <a:alphaOff val="0"/>
+            </a:schemeClr>
+          </a:solidFill>
+          <a:prstDash val="solid"/>
+          <a:miter lim="800000"/>
+        </a:ln>
+        <a:effectLst/>
+      </dsp:spPr>
+      <dsp:style>
+        <a:lnRef idx="2">
+          <a:scrgbClr r="0" g="0" b="0"/>
+        </a:lnRef>
+        <a:fillRef idx="1">
+          <a:scrgbClr r="0" g="0" b="0"/>
+        </a:fillRef>
+        <a:effectRef idx="0">
+          <a:scrgbClr r="0" g="0" b="0"/>
+        </a:effectRef>
+        <a:fontRef idx="minor">
+          <a:schemeClr val="lt1"/>
+        </a:fontRef>
+      </dsp:style>
+      <dsp:txBody>
+        <a:bodyPr spcFirstLastPara="0" vert="horz" wrap="square" lIns="26035" tIns="26035" rIns="26035" bIns="194608" numCol="1" spcCol="1270" anchor="ctr" anchorCtr="0">
+          <a:noAutofit/>
+        </a:bodyPr>
+        <a:lstStyle/>
+        <a:p>
+          <a:pPr marL="0" lvl="0" indent="0" algn="ctr" defTabSz="1822450">
+            <a:lnSpc>
+              <a:spcPct val="90000"/>
             </a:lnSpc>
             <a:spcBef>
               <a:spcPct val="0"/>
@@ -5427,15 +5760,147 @@
             <a:buNone/>
           </a:pPr>
           <a:r>
-            <a:rPr lang="nl-NL" sz="800" kern="1200" dirty="0" err="1"/>
-            <a:t>Book_id</a:t>
+            <a:rPr lang="nl-NL" sz="4100" kern="1200" dirty="0"/>
+            <a:t>Ratings</a:t>
           </a:r>
-          <a:endParaRPr lang="nl-NL" sz="800" kern="1200" dirty="0"/>
+          <a:endParaRPr lang="en-GB" sz="4100" kern="1200" dirty="0"/>
         </a:p>
+      </dsp:txBody>
+      <dsp:txXfrm>
+        <a:off x="330029" y="4353795"/>
+        <a:ext cx="2663631" cy="1379110"/>
+      </dsp:txXfrm>
+    </dsp:sp>
+    <dsp:sp modelId="{4C4EA54F-25D6-4B79-993B-54C8E2FEDFCF}">
+      <dsp:nvSpPr>
+        <dsp:cNvPr id="0" name=""/>
+        <dsp:cNvSpPr/>
+      </dsp:nvSpPr>
+      <dsp:spPr>
+        <a:xfrm>
+          <a:off x="862756" y="5426437"/>
+          <a:ext cx="2397268" cy="459703"/>
+        </a:xfrm>
+        <a:prstGeom prst="rect">
+          <a:avLst/>
+        </a:prstGeom>
+        <a:solidFill>
+          <a:schemeClr val="lt1">
+            <a:alpha val="90000"/>
+            <a:hueOff val="0"/>
+            <a:satOff val="0"/>
+            <a:lumOff val="0"/>
+            <a:alphaOff val="0"/>
+          </a:schemeClr>
+        </a:solidFill>
+        <a:ln w="12700" cap="flat" cmpd="sng" algn="ctr">
+          <a:solidFill>
+            <a:schemeClr val="accent1">
+              <a:hueOff val="0"/>
+              <a:satOff val="0"/>
+              <a:lumOff val="0"/>
+              <a:alphaOff val="0"/>
+            </a:schemeClr>
+          </a:solidFill>
+          <a:prstDash val="solid"/>
+          <a:miter lim="800000"/>
+        </a:ln>
+        <a:effectLst/>
+      </dsp:spPr>
+      <dsp:style>
+        <a:lnRef idx="2">
+          <a:scrgbClr r="0" g="0" b="0"/>
+        </a:lnRef>
+        <a:fillRef idx="1">
+          <a:scrgbClr r="0" g="0" b="0"/>
+        </a:fillRef>
+        <a:effectRef idx="0">
+          <a:scrgbClr r="0" g="0" b="0"/>
+        </a:effectRef>
+        <a:fontRef idx="minor"/>
+      </dsp:style>
+      <dsp:txBody>
+        <a:bodyPr spcFirstLastPara="0" vert="horz" wrap="square" lIns="76200" tIns="19050" rIns="76200" bIns="19050" numCol="1" spcCol="1270" anchor="ctr" anchorCtr="0">
+          <a:noAutofit/>
+        </a:bodyPr>
+        <a:lstStyle/>
         <a:p>
-          <a:pPr marL="0" lvl="0" indent="0" algn="l" defTabSz="355600">
+          <a:pPr marL="0" lvl="0" indent="0" algn="r" defTabSz="1333500">
             <a:lnSpc>
-              <a:spcPct val="100000"/>
+              <a:spcPct val="90000"/>
+            </a:lnSpc>
+            <a:spcBef>
+              <a:spcPct val="0"/>
+            </a:spcBef>
+            <a:spcAft>
+              <a:spcPct val="35000"/>
+            </a:spcAft>
+            <a:buNone/>
+          </a:pPr>
+          <a:endParaRPr lang="en-GB" sz="3000" kern="1200" dirty="0"/>
+        </a:p>
+      </dsp:txBody>
+      <dsp:txXfrm>
+        <a:off x="862756" y="5426437"/>
+        <a:ext cx="2397268" cy="459703"/>
+      </dsp:txXfrm>
+    </dsp:sp>
+    <dsp:sp modelId="{641F6D4B-C949-4B07-BEFB-A64B2D62A743}">
+      <dsp:nvSpPr>
+        <dsp:cNvPr id="0" name=""/>
+        <dsp:cNvSpPr/>
+      </dsp:nvSpPr>
+      <dsp:spPr>
+        <a:xfrm>
+          <a:off x="3903609" y="4353795"/>
+          <a:ext cx="2663631" cy="1379110"/>
+        </a:xfrm>
+        <a:prstGeom prst="rect">
+          <a:avLst/>
+        </a:prstGeom>
+        <a:solidFill>
+          <a:schemeClr val="accent2">
+            <a:lumMod val="60000"/>
+            <a:lumOff val="40000"/>
+          </a:schemeClr>
+        </a:solidFill>
+        <a:ln w="12700" cap="flat" cmpd="sng" algn="ctr">
+          <a:solidFill>
+            <a:schemeClr val="lt1">
+              <a:hueOff val="0"/>
+              <a:satOff val="0"/>
+              <a:lumOff val="0"/>
+              <a:alphaOff val="0"/>
+            </a:schemeClr>
+          </a:solidFill>
+          <a:prstDash val="solid"/>
+          <a:miter lim="800000"/>
+        </a:ln>
+        <a:effectLst/>
+      </dsp:spPr>
+      <dsp:style>
+        <a:lnRef idx="2">
+          <a:scrgbClr r="0" g="0" b="0"/>
+        </a:lnRef>
+        <a:fillRef idx="1">
+          <a:scrgbClr r="0" g="0" b="0"/>
+        </a:fillRef>
+        <a:effectRef idx="0">
+          <a:scrgbClr r="0" g="0" b="0"/>
+        </a:effectRef>
+        <a:fontRef idx="minor">
+          <a:schemeClr val="lt1"/>
+        </a:fontRef>
+      </dsp:style>
+      <dsp:txBody>
+        <a:bodyPr spcFirstLastPara="0" vert="horz" wrap="square" lIns="26035" tIns="26035" rIns="26035" bIns="194608" numCol="1" spcCol="1270" anchor="ctr" anchorCtr="0">
+          <a:noAutofit/>
+        </a:bodyPr>
+        <a:lstStyle/>
+        <a:p>
+          <a:pPr marL="0" lvl="0" indent="0" algn="ctr" defTabSz="1822450">
+            <a:lnSpc>
+              <a:spcPct val="90000"/>
             </a:lnSpc>
             <a:spcBef>
               <a:spcPct val="0"/>
@@ -5446,14 +5911,78 @@
             <a:buNone/>
           </a:pPr>
           <a:r>
-            <a:rPr lang="nl-NL" sz="800" kern="1200" dirty="0"/>
-            <a:t>11,742,003 reviews</a:t>
+            <a:rPr lang="nl-NL" sz="4100" kern="1200" dirty="0"/>
+            <a:t>Review </a:t>
           </a:r>
+          <a:r>
+            <a:rPr lang="nl-NL" sz="4100" kern="1200" dirty="0" err="1"/>
+            <a:t>text</a:t>
+          </a:r>
+          <a:endParaRPr lang="en-GB" sz="4100" kern="1200" dirty="0"/>
         </a:p>
+      </dsp:txBody>
+      <dsp:txXfrm>
+        <a:off x="3903609" y="4353795"/>
+        <a:ext cx="2663631" cy="1379110"/>
+      </dsp:txXfrm>
+    </dsp:sp>
+    <dsp:sp modelId="{EBF22B7B-F3B1-4B4C-A89F-D3867E6B03DB}">
+      <dsp:nvSpPr>
+        <dsp:cNvPr id="0" name=""/>
+        <dsp:cNvSpPr/>
+      </dsp:nvSpPr>
+      <dsp:spPr>
+        <a:xfrm>
+          <a:off x="4436336" y="5426437"/>
+          <a:ext cx="2397268" cy="459703"/>
+        </a:xfrm>
+        <a:prstGeom prst="rect">
+          <a:avLst/>
+        </a:prstGeom>
+        <a:solidFill>
+          <a:schemeClr val="lt1">
+            <a:alpha val="90000"/>
+            <a:hueOff val="0"/>
+            <a:satOff val="0"/>
+            <a:lumOff val="0"/>
+            <a:alphaOff val="0"/>
+          </a:schemeClr>
+        </a:solidFill>
+        <a:ln w="12700" cap="flat" cmpd="sng" algn="ctr">
+          <a:solidFill>
+            <a:schemeClr val="accent1">
+              <a:hueOff val="0"/>
+              <a:satOff val="0"/>
+              <a:lumOff val="0"/>
+              <a:alphaOff val="0"/>
+            </a:schemeClr>
+          </a:solidFill>
+          <a:prstDash val="solid"/>
+          <a:miter lim="800000"/>
+        </a:ln>
+        <a:effectLst/>
+      </dsp:spPr>
+      <dsp:style>
+        <a:lnRef idx="2">
+          <a:scrgbClr r="0" g="0" b="0"/>
+        </a:lnRef>
+        <a:fillRef idx="1">
+          <a:scrgbClr r="0" g="0" b="0"/>
+        </a:fillRef>
+        <a:effectRef idx="0">
+          <a:scrgbClr r="0" g="0" b="0"/>
+        </a:effectRef>
+        <a:fontRef idx="minor"/>
+      </dsp:style>
+      <dsp:txBody>
+        <a:bodyPr spcFirstLastPara="0" vert="horz" wrap="square" lIns="76200" tIns="19050" rIns="76200" bIns="19050" numCol="1" spcCol="1270" anchor="ctr" anchorCtr="0">
+          <a:noAutofit/>
+        </a:bodyPr>
+        <a:lstStyle/>
         <a:p>
-          <a:pPr marL="0" lvl="0" indent="0" algn="l" defTabSz="355600">
+          <a:pPr marL="0" lvl="0" indent="0" algn="r" defTabSz="1333500">
             <a:lnSpc>
-              <a:spcPct val="100000"/>
+              <a:spcPct val="90000"/>
             </a:lnSpc>
             <a:spcBef>
               <a:spcPct val="0"/>
@@ -5463,20 +5992,12 @@
             </a:spcAft>
             <a:buNone/>
           </a:pPr>
-          <a:r>
-            <a:rPr lang="nl-NL" sz="800" kern="1200" dirty="0"/>
-            <a:t>20,000 </a:t>
-          </a:r>
-          <a:r>
-            <a:rPr lang="nl-NL" sz="800" kern="1200" dirty="0" err="1"/>
-            <a:t>books</a:t>
-          </a:r>
-          <a:endParaRPr lang="en-GB" sz="800" kern="1200" dirty="0"/>
+          <a:endParaRPr lang="en-GB" sz="3000" kern="1200"/>
         </a:p>
       </dsp:txBody>
       <dsp:txXfrm>
-        <a:off x="811023" y="4458196"/>
-        <a:ext cx="3230544" cy="1099607"/>
+        <a:off x="4436336" y="5426437"/>
+        <a:ext cx="2397268" cy="459703"/>
       </dsp:txXfrm>
     </dsp:sp>
     <dsp:sp modelId="{47E73B8C-6DD0-494C-B59F-69E349C5DDFB}">
@@ -5486,8 +6007,8 @@
       </dsp:nvSpPr>
       <dsp:spPr>
         <a:xfrm>
-          <a:off x="4908857" y="3252768"/>
-          <a:ext cx="3589493" cy="1858480"/>
+          <a:off x="5690400" y="2177865"/>
+          <a:ext cx="2663631" cy="1379110"/>
         </a:xfrm>
         <a:prstGeom prst="rect">
           <a:avLst/>
@@ -5524,12 +6045,12 @@
         </a:fontRef>
       </dsp:style>
       <dsp:txBody>
-        <a:bodyPr spcFirstLastPara="0" vert="horz" wrap="square" lIns="15875" tIns="15875" rIns="15875" bIns="262252" numCol="1" spcCol="1270" anchor="ctr" anchorCtr="0">
+        <a:bodyPr spcFirstLastPara="0" vert="horz" wrap="square" lIns="26035" tIns="26035" rIns="26035" bIns="194608" numCol="1" spcCol="1270" anchor="ctr" anchorCtr="0">
           <a:noAutofit/>
         </a:bodyPr>
         <a:lstStyle/>
         <a:p>
-          <a:pPr marL="0" lvl="0" indent="0" algn="ctr" defTabSz="1111250">
+          <a:pPr marL="0" lvl="0" indent="0" algn="ctr" defTabSz="1822450">
             <a:lnSpc>
               <a:spcPct val="90000"/>
             </a:lnSpc>
@@ -5542,15 +6063,15 @@
             <a:buNone/>
           </a:pPr>
           <a:r>
-            <a:rPr lang="nl-NL" sz="2500" kern="1200" dirty="0"/>
+            <a:rPr lang="nl-NL" sz="4100" kern="1200" dirty="0"/>
             <a:t>Giveaways</a:t>
           </a:r>
-          <a:endParaRPr lang="en-GB" sz="2500" kern="1200" dirty="0"/>
+          <a:endParaRPr lang="en-GB" sz="4100" kern="1200" dirty="0"/>
         </a:p>
       </dsp:txBody>
       <dsp:txXfrm>
-        <a:off x="4908857" y="3252768"/>
-        <a:ext cx="3589493" cy="1858480"/>
+        <a:off x="5690400" y="2177865"/>
+        <a:ext cx="2663631" cy="1379110"/>
       </dsp:txXfrm>
     </dsp:sp>
     <dsp:sp modelId="{7C27D4AB-ED75-41ED-BA81-DBF373CC06F2}">
@@ -5560,8 +6081,8 @@
       </dsp:nvSpPr>
       <dsp:spPr>
         <a:xfrm>
-          <a:off x="5626756" y="4448424"/>
-          <a:ext cx="3230544" cy="1119152"/>
+          <a:off x="6223126" y="3065117"/>
+          <a:ext cx="2397268" cy="830482"/>
         </a:xfrm>
         <a:prstGeom prst="rect">
           <a:avLst/>
@@ -5701,8 +6222,8 @@
         </a:p>
       </dsp:txBody>
       <dsp:txXfrm>
-        <a:off x="5626756" y="4448424"/>
-        <a:ext cx="3230544" cy="1119152"/>
+        <a:off x="6223126" y="3065117"/>
+        <a:ext cx="2397268" cy="830482"/>
       </dsp:txXfrm>
     </dsp:sp>
   </dsp:spTree>
@@ -10288,7 +10809,7 @@
           <a:p>
             <a:fld id="{D91A2E29-2AFA-4D55-9F70-4E5E0CA11D74}" type="datetimeFigureOut">
               <a:rPr lang="en-GB" smtClean="0"/>
-              <a:t>11/04/2022</a:t>
+              <a:t>13/04/2022</a:t>
             </a:fld>
             <a:endParaRPr lang="en-GB"/>
           </a:p>
@@ -10488,7 +11009,7 @@
           <a:p>
             <a:fld id="{D91A2E29-2AFA-4D55-9F70-4E5E0CA11D74}" type="datetimeFigureOut">
               <a:rPr lang="en-GB" smtClean="0"/>
-              <a:t>11/04/2022</a:t>
+              <a:t>13/04/2022</a:t>
             </a:fld>
             <a:endParaRPr lang="en-GB"/>
           </a:p>
@@ -10698,7 +11219,7 @@
           <a:p>
             <a:fld id="{D91A2E29-2AFA-4D55-9F70-4E5E0CA11D74}" type="datetimeFigureOut">
               <a:rPr lang="en-GB" smtClean="0"/>
-              <a:t>11/04/2022</a:t>
+              <a:t>13/04/2022</a:t>
             </a:fld>
             <a:endParaRPr lang="en-GB"/>
           </a:p>
@@ -10898,7 +11419,7 @@
           <a:p>
             <a:fld id="{D91A2E29-2AFA-4D55-9F70-4E5E0CA11D74}" type="datetimeFigureOut">
               <a:rPr lang="en-GB" smtClean="0"/>
-              <a:t>11/04/2022</a:t>
+              <a:t>13/04/2022</a:t>
             </a:fld>
             <a:endParaRPr lang="en-GB"/>
           </a:p>
@@ -11174,7 +11695,7 @@
           <a:p>
             <a:fld id="{D91A2E29-2AFA-4D55-9F70-4E5E0CA11D74}" type="datetimeFigureOut">
               <a:rPr lang="en-GB" smtClean="0"/>
-              <a:t>11/04/2022</a:t>
+              <a:t>13/04/2022</a:t>
             </a:fld>
             <a:endParaRPr lang="en-GB"/>
           </a:p>
@@ -11442,7 +11963,7 @@
           <a:p>
             <a:fld id="{D91A2E29-2AFA-4D55-9F70-4E5E0CA11D74}" type="datetimeFigureOut">
               <a:rPr lang="en-GB" smtClean="0"/>
-              <a:t>11/04/2022</a:t>
+              <a:t>13/04/2022</a:t>
             </a:fld>
             <a:endParaRPr lang="en-GB"/>
           </a:p>
@@ -11857,7 +12378,7 @@
           <a:p>
             <a:fld id="{D91A2E29-2AFA-4D55-9F70-4E5E0CA11D74}" type="datetimeFigureOut">
               <a:rPr lang="en-GB" smtClean="0"/>
-              <a:t>11/04/2022</a:t>
+              <a:t>13/04/2022</a:t>
             </a:fld>
             <a:endParaRPr lang="en-GB"/>
           </a:p>
@@ -11999,7 +12520,7 @@
           <a:p>
             <a:fld id="{D91A2E29-2AFA-4D55-9F70-4E5E0CA11D74}" type="datetimeFigureOut">
               <a:rPr lang="en-GB" smtClean="0"/>
-              <a:t>11/04/2022</a:t>
+              <a:t>13/04/2022</a:t>
             </a:fld>
             <a:endParaRPr lang="en-GB"/>
           </a:p>
@@ -12112,7 +12633,7 @@
           <a:p>
             <a:fld id="{D91A2E29-2AFA-4D55-9F70-4E5E0CA11D74}" type="datetimeFigureOut">
               <a:rPr lang="en-GB" smtClean="0"/>
-              <a:t>11/04/2022</a:t>
+              <a:t>13/04/2022</a:t>
             </a:fld>
             <a:endParaRPr lang="en-GB"/>
           </a:p>
@@ -12425,7 +12946,7 @@
           <a:p>
             <a:fld id="{D91A2E29-2AFA-4D55-9F70-4E5E0CA11D74}" type="datetimeFigureOut">
               <a:rPr lang="en-GB" smtClean="0"/>
-              <a:t>11/04/2022</a:t>
+              <a:t>13/04/2022</a:t>
             </a:fld>
             <a:endParaRPr lang="en-GB"/>
           </a:p>
@@ -12714,7 +13235,7 @@
           <a:p>
             <a:fld id="{D91A2E29-2AFA-4D55-9F70-4E5E0CA11D74}" type="datetimeFigureOut">
               <a:rPr lang="en-GB" smtClean="0"/>
-              <a:t>11/04/2022</a:t>
+              <a:t>13/04/2022</a:t>
             </a:fld>
             <a:endParaRPr lang="en-GB"/>
           </a:p>
@@ -12957,7 +13478,7 @@
           <a:p>
             <a:fld id="{D91A2E29-2AFA-4D55-9F70-4E5E0CA11D74}" type="datetimeFigureOut">
               <a:rPr lang="en-GB" smtClean="0"/>
-              <a:t>11/04/2022</a:t>
+              <a:t>13/04/2022</a:t>
             </a:fld>
             <a:endParaRPr lang="en-GB"/>
           </a:p>
@@ -13445,7 +13966,7 @@
           <p:nvPr>
             <p:extLst>
               <p:ext uri="{D42A27DB-BD31-4B8C-83A1-F6EECF244321}">
-                <p14:modId xmlns:p14="http://schemas.microsoft.com/office/powerpoint/2010/main" val="128044482"/>
+                <p14:modId xmlns:p14="http://schemas.microsoft.com/office/powerpoint/2010/main" val="215798803"/>
               </p:ext>
             </p:extLst>
           </p:nvPr>

</xml_diff>